<commit_message>
Save changes to .pptx file
</commit_message>
<xml_diff>
--- a/Class Presentations/Day3 JS Class.pptx
+++ b/Class Presentations/Day3 JS Class.pptx
@@ -5771,7 +5771,7 @@
       </p:sp>
       <p:sp>
         <p:nvSpPr>
-          <p:cNvPr id="5" name="PB"/>
+          <p:cNvPr id="6" name="PB"/>
           <p:cNvSpPr/>
           <p:nvPr/>
         </p:nvSpPr>
@@ -5783,11 +5783,9 @@
           <a:prstGeom prst="rect">
             <a:avLst/>
           </a:prstGeom>
-          <a:blipFill rotWithShape="1">
-            <a:blip r:embed="rId2"/>
-            <a:srcRect/>
-            <a:tile tx="0" ty="0" sx="100000" sy="100000" flip="none" algn="tl"/>
-          </a:blipFill>
+          <a:solidFill>
+            <a:srgbClr val="00A6AC"/>
+          </a:solidFill>
           <a:ln w="12700" cap="flat">
             <a:noFill/>
             <a:miter lim="400000"/>
@@ -5968,7 +5966,7 @@
       </p:sp>
       <p:sp>
         <p:nvSpPr>
-          <p:cNvPr id="7" name="PB"/>
+          <p:cNvPr id="8" name="PB"/>
           <p:cNvSpPr/>
           <p:nvPr/>
         </p:nvSpPr>
@@ -5980,11 +5978,9 @@
           <a:prstGeom prst="rect">
             <a:avLst/>
           </a:prstGeom>
-          <a:blipFill rotWithShape="1">
-            <a:blip r:embed="rId3"/>
-            <a:srcRect/>
-            <a:tile tx="0" ty="0" sx="100000" sy="100000" flip="none" algn="tl"/>
-          </a:blipFill>
+          <a:solidFill>
+            <a:srgbClr val="00A6AC"/>
+          </a:solidFill>
           <a:ln w="12700" cap="flat">
             <a:noFill/>
             <a:miter lim="400000"/>
@@ -6242,7 +6238,7 @@
       </p:sp>
       <p:sp>
         <p:nvSpPr>
-          <p:cNvPr id="7" name="PB"/>
+          <p:cNvPr id="8" name="PB"/>
           <p:cNvSpPr/>
           <p:nvPr/>
         </p:nvSpPr>
@@ -6254,11 +6250,9 @@
           <a:prstGeom prst="rect">
             <a:avLst/>
           </a:prstGeom>
-          <a:blipFill rotWithShape="1">
-            <a:blip r:embed="rId3"/>
-            <a:srcRect/>
-            <a:tile tx="0" ty="0" sx="100000" sy="100000" flip="none" algn="tl"/>
-          </a:blipFill>
+          <a:solidFill>
+            <a:srgbClr val="00A6AC"/>
+          </a:solidFill>
           <a:ln w="12700" cap="flat">
             <a:noFill/>
             <a:miter lim="400000"/>
@@ -6605,7 +6599,7 @@
       </p:sp>
       <p:sp>
         <p:nvSpPr>
-          <p:cNvPr id="8" name="PB"/>
+          <p:cNvPr id="9" name="PB"/>
           <p:cNvSpPr/>
           <p:nvPr/>
         </p:nvSpPr>
@@ -6617,11 +6611,9 @@
           <a:prstGeom prst="rect">
             <a:avLst/>
           </a:prstGeom>
-          <a:blipFill rotWithShape="1">
-            <a:blip r:embed="rId3"/>
-            <a:srcRect/>
-            <a:tile tx="0" ty="0" sx="100000" sy="100000" flip="none" algn="tl"/>
-          </a:blipFill>
+          <a:solidFill>
+            <a:srgbClr val="00A6AC"/>
+          </a:solidFill>
           <a:ln w="12700" cap="flat">
             <a:noFill/>
             <a:miter lim="400000"/>
@@ -6912,7 +6904,7 @@
       </p:sp>
       <p:sp>
         <p:nvSpPr>
-          <p:cNvPr id="8" name="PB"/>
+          <p:cNvPr id="9" name="PB"/>
           <p:cNvSpPr/>
           <p:nvPr/>
         </p:nvSpPr>
@@ -6924,11 +6916,9 @@
           <a:prstGeom prst="rect">
             <a:avLst/>
           </a:prstGeom>
-          <a:blipFill rotWithShape="1">
-            <a:blip r:embed="rId3"/>
-            <a:srcRect/>
-            <a:tile tx="0" ty="0" sx="100000" sy="100000" flip="none" algn="tl"/>
-          </a:blipFill>
+          <a:solidFill>
+            <a:srgbClr val="00A6AC"/>
+          </a:solidFill>
           <a:ln w="12700" cap="flat">
             <a:noFill/>
             <a:miter lim="400000"/>
@@ -7194,7 +7184,7 @@
       </p:sp>
       <p:sp>
         <p:nvSpPr>
-          <p:cNvPr id="8" name="PB"/>
+          <p:cNvPr id="9" name="PB"/>
           <p:cNvSpPr/>
           <p:nvPr/>
         </p:nvSpPr>
@@ -7206,11 +7196,9 @@
           <a:prstGeom prst="rect">
             <a:avLst/>
           </a:prstGeom>
-          <a:blipFill rotWithShape="1">
-            <a:blip r:embed="rId3"/>
-            <a:srcRect/>
-            <a:tile tx="0" ty="0" sx="100000" sy="100000" flip="none" algn="tl"/>
-          </a:blipFill>
+          <a:solidFill>
+            <a:srgbClr val="00A6AC"/>
+          </a:solidFill>
           <a:ln w="12700" cap="flat">
             <a:noFill/>
             <a:miter lim="400000"/>
@@ -7466,7 +7454,7 @@
       </p:sp>
       <p:sp>
         <p:nvSpPr>
-          <p:cNvPr id="8" name="PB"/>
+          <p:cNvPr id="9" name="PB"/>
           <p:cNvSpPr/>
           <p:nvPr/>
         </p:nvSpPr>
@@ -7478,11 +7466,9 @@
           <a:prstGeom prst="rect">
             <a:avLst/>
           </a:prstGeom>
-          <a:blipFill rotWithShape="1">
-            <a:blip r:embed="rId3"/>
-            <a:srcRect/>
-            <a:tile tx="0" ty="0" sx="100000" sy="100000" flip="none" algn="tl"/>
-          </a:blipFill>
+          <a:solidFill>
+            <a:srgbClr val="00A6AC"/>
+          </a:solidFill>
           <a:ln w="12700" cap="flat">
             <a:noFill/>
             <a:miter lim="400000"/>
@@ -7780,7 +7766,7 @@
       </p:sp>
       <p:sp>
         <p:nvSpPr>
-          <p:cNvPr id="8" name="PB"/>
+          <p:cNvPr id="9" name="PB"/>
           <p:cNvSpPr/>
           <p:nvPr/>
         </p:nvSpPr>
@@ -7792,11 +7778,9 @@
           <a:prstGeom prst="rect">
             <a:avLst/>
           </a:prstGeom>
-          <a:blipFill rotWithShape="1">
-            <a:blip r:embed="rId3"/>
-            <a:srcRect/>
-            <a:tile tx="0" ty="0" sx="100000" sy="100000" flip="none" algn="tl"/>
-          </a:blipFill>
+          <a:solidFill>
+            <a:srgbClr val="00A6AC"/>
+          </a:solidFill>
           <a:ln w="12700" cap="flat">
             <a:noFill/>
             <a:miter lim="400000"/>
@@ -8150,7 +8134,7 @@
       </p:sp>
       <p:sp>
         <p:nvSpPr>
-          <p:cNvPr id="8" name="PB"/>
+          <p:cNvPr id="9" name="PB"/>
           <p:cNvSpPr/>
           <p:nvPr/>
         </p:nvSpPr>
@@ -8162,11 +8146,9 @@
           <a:prstGeom prst="rect">
             <a:avLst/>
           </a:prstGeom>
-          <a:blipFill rotWithShape="1">
-            <a:blip r:embed="rId3"/>
-            <a:srcRect/>
-            <a:tile tx="0" ty="0" sx="100000" sy="100000" flip="none" algn="tl"/>
-          </a:blipFill>
+          <a:solidFill>
+            <a:srgbClr val="00A6AC"/>
+          </a:solidFill>
           <a:ln w="12700" cap="flat">
             <a:noFill/>
             <a:miter lim="400000"/>
@@ -8546,7 +8528,7 @@
       </p:sp>
       <p:sp>
         <p:nvSpPr>
-          <p:cNvPr id="8" name="PB"/>
+          <p:cNvPr id="9" name="PB"/>
           <p:cNvSpPr/>
           <p:nvPr/>
         </p:nvSpPr>
@@ -8558,11 +8540,9 @@
           <a:prstGeom prst="rect">
             <a:avLst/>
           </a:prstGeom>
-          <a:blipFill rotWithShape="1">
-            <a:blip r:embed="rId3"/>
-            <a:srcRect/>
-            <a:tile tx="0" ty="0" sx="100000" sy="100000" flip="none" algn="tl"/>
-          </a:blipFill>
+          <a:solidFill>
+            <a:srgbClr val="00A6AC"/>
+          </a:solidFill>
           <a:ln w="12700" cap="flat">
             <a:noFill/>
             <a:miter lim="400000"/>
@@ -8761,7 +8741,7 @@
       </p:sp>
       <p:sp>
         <p:nvSpPr>
-          <p:cNvPr id="7" name="PB"/>
+          <p:cNvPr id="8" name="PB"/>
           <p:cNvSpPr/>
           <p:nvPr/>
         </p:nvSpPr>
@@ -8773,11 +8753,9 @@
           <a:prstGeom prst="rect">
             <a:avLst/>
           </a:prstGeom>
-          <a:blipFill rotWithShape="1">
-            <a:blip r:embed="rId3"/>
-            <a:srcRect/>
-            <a:tile tx="0" ty="0" sx="100000" sy="100000" flip="none" algn="tl"/>
-          </a:blipFill>
+          <a:solidFill>
+            <a:srgbClr val="00A6AC"/>
+          </a:solidFill>
           <a:ln w="12700" cap="flat">
             <a:noFill/>
             <a:miter lim="400000"/>
@@ -8902,7 +8880,7 @@
       </p:sp>
       <p:sp>
         <p:nvSpPr>
-          <p:cNvPr id="5" name="PB"/>
+          <p:cNvPr id="6" name="PB"/>
           <p:cNvSpPr/>
           <p:nvPr/>
         </p:nvSpPr>
@@ -8914,11 +8892,9 @@
           <a:prstGeom prst="rect">
             <a:avLst/>
           </a:prstGeom>
-          <a:blipFill rotWithShape="1">
-            <a:blip r:embed="rId2"/>
-            <a:srcRect/>
-            <a:tile tx="0" ty="0" sx="100000" sy="100000" flip="none" algn="tl"/>
-          </a:blipFill>
+          <a:solidFill>
+            <a:srgbClr val="00A6AC"/>
+          </a:solidFill>
           <a:ln w="12700" cap="flat">
             <a:noFill/>
             <a:miter lim="400000"/>
@@ -9107,7 +9083,7 @@
       </p:sp>
       <p:sp>
         <p:nvSpPr>
-          <p:cNvPr id="7" name="PB"/>
+          <p:cNvPr id="8" name="PB"/>
           <p:cNvSpPr/>
           <p:nvPr/>
         </p:nvSpPr>
@@ -9119,11 +9095,9 @@
           <a:prstGeom prst="rect">
             <a:avLst/>
           </a:prstGeom>
-          <a:blipFill rotWithShape="1">
-            <a:blip r:embed="rId3"/>
-            <a:srcRect/>
-            <a:tile tx="0" ty="0" sx="100000" sy="100000" flip="none" algn="tl"/>
-          </a:blipFill>
+          <a:solidFill>
+            <a:srgbClr val="00A6AC"/>
+          </a:solidFill>
           <a:ln w="12700" cap="flat">
             <a:noFill/>
             <a:miter lim="400000"/>
@@ -9461,7 +9435,7 @@
       </p:sp>
       <p:sp>
         <p:nvSpPr>
-          <p:cNvPr id="8" name="PB"/>
+          <p:cNvPr id="9" name="PB"/>
           <p:cNvSpPr/>
           <p:nvPr/>
         </p:nvSpPr>
@@ -9473,11 +9447,9 @@
           <a:prstGeom prst="rect">
             <a:avLst/>
           </a:prstGeom>
-          <a:blipFill rotWithShape="1">
-            <a:blip r:embed="rId3"/>
-            <a:srcRect/>
-            <a:tile tx="0" ty="0" sx="100000" sy="100000" flip="none" algn="tl"/>
-          </a:blipFill>
+          <a:solidFill>
+            <a:srgbClr val="00A6AC"/>
+          </a:solidFill>
           <a:ln w="12700" cap="flat">
             <a:noFill/>
             <a:miter lim="400000"/>
@@ -9648,7 +9620,7 @@
       </p:sp>
       <p:sp>
         <p:nvSpPr>
-          <p:cNvPr id="7" name="PB"/>
+          <p:cNvPr id="8" name="PB"/>
           <p:cNvSpPr/>
           <p:nvPr/>
         </p:nvSpPr>
@@ -9660,11 +9632,9 @@
           <a:prstGeom prst="rect">
             <a:avLst/>
           </a:prstGeom>
-          <a:blipFill rotWithShape="1">
-            <a:blip r:embed="rId3"/>
-            <a:srcRect/>
-            <a:tile tx="0" ty="0" sx="100000" sy="100000" flip="none" algn="tl"/>
-          </a:blipFill>
+          <a:solidFill>
+            <a:srgbClr val="00A6AC"/>
+          </a:solidFill>
           <a:ln w="12700" cap="flat">
             <a:noFill/>
             <a:miter lim="400000"/>
@@ -10000,7 +9970,7 @@
       </p:sp>
       <p:sp>
         <p:nvSpPr>
-          <p:cNvPr id="5" name="PB"/>
+          <p:cNvPr id="6" name="PB"/>
           <p:cNvSpPr/>
           <p:nvPr/>
         </p:nvSpPr>
@@ -10012,11 +9982,9 @@
           <a:prstGeom prst="rect">
             <a:avLst/>
           </a:prstGeom>
-          <a:blipFill rotWithShape="1">
-            <a:blip r:embed="rId2"/>
-            <a:srcRect/>
-            <a:tile tx="0" ty="0" sx="100000" sy="100000" flip="none" algn="tl"/>
-          </a:blipFill>
+          <a:solidFill>
+            <a:srgbClr val="00A6AC"/>
+          </a:solidFill>
           <a:ln w="12700" cap="flat">
             <a:noFill/>
             <a:miter lim="400000"/>
@@ -10081,6 +10049,13 @@
     <a:masterClrMapping/>
   </p:clrMapOvr>
   <p:transition xmlns:p14="http://schemas.microsoft.com/office/powerpoint/2010/main" spd="slow"/>
+  <p:timing>
+    <p:tnLst>
+      <p:par>
+        <p:cTn xmlns:p14="http://schemas.microsoft.com/office/powerpoint/2010/main" id="1" dur="indefinite" restart="never" nodeType="tmRoot"/>
+      </p:par>
+    </p:tnLst>
+  </p:timing>
 </p:sld>
 </file>
 
@@ -10454,7 +10429,7 @@
       </p:sp>
       <p:sp>
         <p:nvSpPr>
-          <p:cNvPr id="8" name="PB"/>
+          <p:cNvPr id="9" name="PB"/>
           <p:cNvSpPr/>
           <p:nvPr/>
         </p:nvSpPr>
@@ -10466,11 +10441,9 @@
           <a:prstGeom prst="rect">
             <a:avLst/>
           </a:prstGeom>
-          <a:blipFill rotWithShape="1">
-            <a:blip r:embed="rId2"/>
-            <a:srcRect/>
-            <a:tile tx="0" ty="0" sx="100000" sy="100000" flip="none" algn="tl"/>
-          </a:blipFill>
+          <a:solidFill>
+            <a:srgbClr val="00A6AC"/>
+          </a:solidFill>
           <a:ln w="12700" cap="flat">
             <a:noFill/>
             <a:miter lim="400000"/>
@@ -10540,6 +10513,13 @@
     <a:masterClrMapping/>
   </p:clrMapOvr>
   <p:transition xmlns:p14="http://schemas.microsoft.com/office/powerpoint/2010/main" spd="med"/>
+  <p:timing>
+    <p:tnLst>
+      <p:par>
+        <p:cTn xmlns:p14="http://schemas.microsoft.com/office/powerpoint/2010/main" id="1" dur="indefinite" restart="never" nodeType="tmRoot"/>
+      </p:par>
+    </p:tnLst>
+  </p:timing>
 </p:sld>
 </file>
 
@@ -10642,7 +10622,7 @@
       </p:sp>
       <p:sp>
         <p:nvSpPr>
-          <p:cNvPr id="7" name="PB"/>
+          <p:cNvPr id="8" name="PB"/>
           <p:cNvSpPr/>
           <p:nvPr/>
         </p:nvSpPr>
@@ -10654,11 +10634,9 @@
           <a:prstGeom prst="rect">
             <a:avLst/>
           </a:prstGeom>
-          <a:blipFill rotWithShape="1">
-            <a:blip r:embed="rId2"/>
-            <a:srcRect/>
-            <a:tile tx="0" ty="0" sx="100000" sy="100000" flip="none" algn="tl"/>
-          </a:blipFill>
+          <a:solidFill>
+            <a:srgbClr val="00A6AC"/>
+          </a:solidFill>
           <a:ln w="12700" cap="flat">
             <a:noFill/>
             <a:miter lim="400000"/>
@@ -10728,6 +10706,13 @@
     <a:masterClrMapping/>
   </p:clrMapOvr>
   <p:transition xmlns:p14="http://schemas.microsoft.com/office/powerpoint/2010/main" spd="med"/>
+  <p:timing>
+    <p:tnLst>
+      <p:par>
+        <p:cTn xmlns:p14="http://schemas.microsoft.com/office/powerpoint/2010/main" id="1" dur="indefinite" restart="never" nodeType="tmRoot"/>
+      </p:par>
+    </p:tnLst>
+  </p:timing>
 </p:sld>
 </file>
 
@@ -10855,7 +10840,7 @@
       </p:sp>
       <p:sp>
         <p:nvSpPr>
-          <p:cNvPr id="7" name="PB"/>
+          <p:cNvPr id="8" name="PB"/>
           <p:cNvSpPr/>
           <p:nvPr/>
         </p:nvSpPr>
@@ -10867,11 +10852,9 @@
           <a:prstGeom prst="rect">
             <a:avLst/>
           </a:prstGeom>
-          <a:blipFill rotWithShape="1">
-            <a:blip r:embed="rId3"/>
-            <a:srcRect/>
-            <a:tile tx="0" ty="0" sx="100000" sy="100000" flip="none" algn="tl"/>
-          </a:blipFill>
+          <a:solidFill>
+            <a:srgbClr val="00A6AC"/>
+          </a:solidFill>
           <a:ln w="12700" cap="flat">
             <a:noFill/>
             <a:miter lim="400000"/>
@@ -10941,6 +10924,13 @@
     <a:masterClrMapping/>
   </p:clrMapOvr>
   <p:transition xmlns:p14="http://schemas.microsoft.com/office/powerpoint/2010/main" spd="med"/>
+  <p:timing>
+    <p:tnLst>
+      <p:par>
+        <p:cTn xmlns:p14="http://schemas.microsoft.com/office/powerpoint/2010/main" id="1" dur="indefinite" restart="never" nodeType="tmRoot"/>
+      </p:par>
+    </p:tnLst>
+  </p:timing>
 </p:sld>
 </file>
 
@@ -11054,7 +11044,7 @@
       </p:sp>
       <p:sp>
         <p:nvSpPr>
-          <p:cNvPr id="7" name="PB"/>
+          <p:cNvPr id="8" name="PB"/>
           <p:cNvSpPr/>
           <p:nvPr/>
         </p:nvSpPr>
@@ -11066,11 +11056,9 @@
           <a:prstGeom prst="rect">
             <a:avLst/>
           </a:prstGeom>
-          <a:blipFill rotWithShape="1">
-            <a:blip r:embed="rId2"/>
-            <a:srcRect/>
-            <a:tile tx="0" ty="0" sx="100000" sy="100000" flip="none" algn="tl"/>
-          </a:blipFill>
+          <a:solidFill>
+            <a:srgbClr val="00A6AC"/>
+          </a:solidFill>
           <a:ln w="12700" cap="flat">
             <a:noFill/>
             <a:miter lim="400000"/>
@@ -11140,6 +11128,13 @@
     <a:masterClrMapping/>
   </p:clrMapOvr>
   <p:transition xmlns:p14="http://schemas.microsoft.com/office/powerpoint/2010/main" spd="med"/>
+  <p:timing>
+    <p:tnLst>
+      <p:par>
+        <p:cTn xmlns:p14="http://schemas.microsoft.com/office/powerpoint/2010/main" id="1" dur="indefinite" restart="never" nodeType="tmRoot"/>
+      </p:par>
+    </p:tnLst>
+  </p:timing>
 </p:sld>
 </file>
 
@@ -11279,7 +11274,7 @@
       </p:sp>
       <p:sp>
         <p:nvSpPr>
-          <p:cNvPr id="7" name="PB"/>
+          <p:cNvPr id="8" name="PB"/>
           <p:cNvSpPr/>
           <p:nvPr/>
         </p:nvSpPr>
@@ -11291,11 +11286,9 @@
           <a:prstGeom prst="rect">
             <a:avLst/>
           </a:prstGeom>
-          <a:blipFill rotWithShape="1">
-            <a:blip r:embed="rId3"/>
-            <a:srcRect/>
-            <a:tile tx="0" ty="0" sx="100000" sy="100000" flip="none" algn="tl"/>
-          </a:blipFill>
+          <a:solidFill>
+            <a:srgbClr val="00A6AC"/>
+          </a:solidFill>
           <a:ln w="12700" cap="flat">
             <a:noFill/>
             <a:miter lim="400000"/>
@@ -11865,7 +11858,7 @@
       </p:sp>
       <p:sp>
         <p:nvSpPr>
-          <p:cNvPr id="8" name="PB"/>
+          <p:cNvPr id="9" name="PB"/>
           <p:cNvSpPr/>
           <p:nvPr/>
         </p:nvSpPr>
@@ -11877,11 +11870,9 @@
           <a:prstGeom prst="rect">
             <a:avLst/>
           </a:prstGeom>
-          <a:blipFill rotWithShape="1">
-            <a:blip r:embed="rId3"/>
-            <a:srcRect/>
-            <a:tile tx="0" ty="0" sx="100000" sy="100000" flip="none" algn="tl"/>
-          </a:blipFill>
+          <a:solidFill>
+            <a:srgbClr val="00A6AC"/>
+          </a:solidFill>
           <a:ln w="12700" cap="flat">
             <a:noFill/>
             <a:miter lim="400000"/>
@@ -12061,7 +12052,7 @@
       </p:sp>
       <p:sp>
         <p:nvSpPr>
-          <p:cNvPr id="6" name="PB"/>
+          <p:cNvPr id="7" name="PB"/>
           <p:cNvSpPr/>
           <p:nvPr/>
         </p:nvSpPr>
@@ -12073,11 +12064,9 @@
           <a:prstGeom prst="rect">
             <a:avLst/>
           </a:prstGeom>
-          <a:blipFill rotWithShape="1">
-            <a:blip r:embed="rId3"/>
-            <a:srcRect/>
-            <a:tile tx="0" ty="0" sx="100000" sy="100000" flip="none" algn="tl"/>
-          </a:blipFill>
+          <a:solidFill>
+            <a:srgbClr val="00A6AC"/>
+          </a:solidFill>
           <a:ln w="12700" cap="flat">
             <a:noFill/>
             <a:miter lim="400000"/>
@@ -12322,7 +12311,7 @@
       </p:sp>
       <p:sp>
         <p:nvSpPr>
-          <p:cNvPr id="7" name="PB"/>
+          <p:cNvPr id="8" name="PB"/>
           <p:cNvSpPr/>
           <p:nvPr/>
         </p:nvSpPr>
@@ -12334,11 +12323,9 @@
           <a:prstGeom prst="rect">
             <a:avLst/>
           </a:prstGeom>
-          <a:blipFill rotWithShape="1">
-            <a:blip r:embed="rId3"/>
-            <a:srcRect/>
-            <a:tile tx="0" ty="0" sx="100000" sy="100000" flip="none" algn="tl"/>
-          </a:blipFill>
+          <a:solidFill>
+            <a:srgbClr val="00A6AC"/>
+          </a:solidFill>
           <a:ln w="12700" cap="flat">
             <a:noFill/>
             <a:miter lim="400000"/>
@@ -12534,7 +12521,7 @@
       </p:sp>
       <p:sp>
         <p:nvSpPr>
-          <p:cNvPr id="6" name="PB"/>
+          <p:cNvPr id="7" name="PB"/>
           <p:cNvSpPr/>
           <p:nvPr/>
         </p:nvSpPr>
@@ -12546,11 +12533,9 @@
           <a:prstGeom prst="rect">
             <a:avLst/>
           </a:prstGeom>
-          <a:blipFill rotWithShape="1">
-            <a:blip r:embed="rId2"/>
-            <a:srcRect/>
-            <a:tile tx="0" ty="0" sx="100000" sy="100000" flip="none" algn="tl"/>
-          </a:blipFill>
+          <a:solidFill>
+            <a:srgbClr val="00A6AC"/>
+          </a:solidFill>
           <a:ln w="12700" cap="flat">
             <a:noFill/>
             <a:miter lim="400000"/>
@@ -12713,7 +12698,7 @@
       </p:sp>
       <p:sp>
         <p:nvSpPr>
-          <p:cNvPr id="7" name="PB"/>
+          <p:cNvPr id="8" name="PB"/>
           <p:cNvSpPr/>
           <p:nvPr/>
         </p:nvSpPr>
@@ -12725,11 +12710,9 @@
           <a:prstGeom prst="rect">
             <a:avLst/>
           </a:prstGeom>
-          <a:blipFill rotWithShape="1">
-            <a:blip r:embed="rId2"/>
-            <a:srcRect/>
-            <a:tile tx="0" ty="0" sx="100000" sy="100000" flip="none" algn="tl"/>
-          </a:blipFill>
+          <a:solidFill>
+            <a:srgbClr val="00A6AC"/>
+          </a:solidFill>
           <a:ln w="12700" cap="flat">
             <a:noFill/>
             <a:miter lim="400000"/>
@@ -12799,6 +12782,13 @@
     <a:masterClrMapping/>
   </p:clrMapOvr>
   <p:transition xmlns:p14="http://schemas.microsoft.com/office/powerpoint/2010/main" spd="med"/>
+  <p:timing>
+    <p:tnLst>
+      <p:par>
+        <p:cTn xmlns:p14="http://schemas.microsoft.com/office/powerpoint/2010/main" id="1" dur="indefinite" restart="never" nodeType="tmRoot"/>
+      </p:par>
+    </p:tnLst>
+  </p:timing>
 </p:sld>
 </file>
 
@@ -12891,7 +12881,7 @@
       </p:sp>
       <p:sp>
         <p:nvSpPr>
-          <p:cNvPr id="7" name="PB"/>
+          <p:cNvPr id="8" name="PB"/>
           <p:cNvSpPr/>
           <p:nvPr/>
         </p:nvSpPr>
@@ -12903,11 +12893,9 @@
           <a:prstGeom prst="rect">
             <a:avLst/>
           </a:prstGeom>
-          <a:blipFill rotWithShape="1">
-            <a:blip r:embed="rId2"/>
-            <a:srcRect/>
-            <a:tile tx="0" ty="0" sx="100000" sy="100000" flip="none" algn="tl"/>
-          </a:blipFill>
+          <a:solidFill>
+            <a:srgbClr val="00A6AC"/>
+          </a:solidFill>
           <a:ln w="12700" cap="flat">
             <a:noFill/>
             <a:miter lim="400000"/>
@@ -12977,6 +12965,13 @@
     <a:masterClrMapping/>
   </p:clrMapOvr>
   <p:transition xmlns:p14="http://schemas.microsoft.com/office/powerpoint/2010/main" spd="med"/>
+  <p:timing>
+    <p:tnLst>
+      <p:par>
+        <p:cTn xmlns:p14="http://schemas.microsoft.com/office/powerpoint/2010/main" id="1" dur="indefinite" restart="never" nodeType="tmRoot"/>
+      </p:par>
+    </p:tnLst>
+  </p:timing>
 </p:sld>
 </file>
 
@@ -13073,7 +13068,7 @@
       </p:sp>
       <p:sp>
         <p:nvSpPr>
-          <p:cNvPr id="7" name="PB"/>
+          <p:cNvPr id="8" name="PB"/>
           <p:cNvSpPr/>
           <p:nvPr/>
         </p:nvSpPr>
@@ -13085,11 +13080,9 @@
           <a:prstGeom prst="rect">
             <a:avLst/>
           </a:prstGeom>
-          <a:blipFill rotWithShape="1">
-            <a:blip r:embed="rId2"/>
-            <a:srcRect/>
-            <a:tile tx="0" ty="0" sx="100000" sy="100000" flip="none" algn="tl"/>
-          </a:blipFill>
+          <a:solidFill>
+            <a:srgbClr val="00A6AC"/>
+          </a:solidFill>
           <a:ln w="12700" cap="flat">
             <a:noFill/>
             <a:miter lim="400000"/>
@@ -13159,6 +13152,13 @@
     <a:masterClrMapping/>
   </p:clrMapOvr>
   <p:transition xmlns:p14="http://schemas.microsoft.com/office/powerpoint/2010/main" spd="med"/>
+  <p:timing>
+    <p:tnLst>
+      <p:par>
+        <p:cTn xmlns:p14="http://schemas.microsoft.com/office/powerpoint/2010/main" id="1" dur="indefinite" restart="never" nodeType="tmRoot"/>
+      </p:par>
+    </p:tnLst>
+  </p:timing>
 </p:sld>
 </file>
 
@@ -13256,7 +13256,7 @@
       </p:sp>
       <p:sp>
         <p:nvSpPr>
-          <p:cNvPr id="7" name="PB"/>
+          <p:cNvPr id="8" name="PB"/>
           <p:cNvSpPr/>
           <p:nvPr/>
         </p:nvSpPr>
@@ -13268,11 +13268,9 @@
           <a:prstGeom prst="rect">
             <a:avLst/>
           </a:prstGeom>
-          <a:blipFill rotWithShape="1">
-            <a:blip r:embed="rId2"/>
-            <a:srcRect/>
-            <a:tile tx="0" ty="0" sx="100000" sy="100000" flip="none" algn="tl"/>
-          </a:blipFill>
+          <a:solidFill>
+            <a:srgbClr val="00A6AC"/>
+          </a:solidFill>
           <a:ln w="12700" cap="flat">
             <a:noFill/>
             <a:miter lim="400000"/>
@@ -13342,6 +13340,13 @@
     <a:masterClrMapping/>
   </p:clrMapOvr>
   <p:transition xmlns:p14="http://schemas.microsoft.com/office/powerpoint/2010/main" spd="med"/>
+  <p:timing>
+    <p:tnLst>
+      <p:par>
+        <p:cTn xmlns:p14="http://schemas.microsoft.com/office/powerpoint/2010/main" id="1" dur="indefinite" restart="never" nodeType="tmRoot"/>
+      </p:par>
+    </p:tnLst>
+  </p:timing>
 </p:sld>
 </file>
 
@@ -13432,7 +13437,7 @@
       </p:sp>
       <p:sp>
         <p:nvSpPr>
-          <p:cNvPr id="7" name="PB"/>
+          <p:cNvPr id="8" name="PB"/>
           <p:cNvSpPr/>
           <p:nvPr/>
         </p:nvSpPr>
@@ -13444,11 +13449,9 @@
           <a:prstGeom prst="rect">
             <a:avLst/>
           </a:prstGeom>
-          <a:blipFill rotWithShape="1">
-            <a:blip r:embed="rId2"/>
-            <a:srcRect/>
-            <a:tile tx="0" ty="0" sx="100000" sy="100000" flip="none" algn="tl"/>
-          </a:blipFill>
+          <a:solidFill>
+            <a:srgbClr val="00A6AC"/>
+          </a:solidFill>
           <a:ln w="12700" cap="flat">
             <a:noFill/>
             <a:miter lim="400000"/>
@@ -13518,6 +13521,13 @@
     <a:masterClrMapping/>
   </p:clrMapOvr>
   <p:transition xmlns:p14="http://schemas.microsoft.com/office/powerpoint/2010/main" spd="med"/>
+  <p:timing>
+    <p:tnLst>
+      <p:par>
+        <p:cTn xmlns:p14="http://schemas.microsoft.com/office/powerpoint/2010/main" id="1" dur="indefinite" restart="never" nodeType="tmRoot"/>
+      </p:par>
+    </p:tnLst>
+  </p:timing>
 </p:sld>
 </file>
 
@@ -13613,7 +13623,7 @@
       </p:sp>
       <p:sp>
         <p:nvSpPr>
-          <p:cNvPr id="7" name="PB"/>
+          <p:cNvPr id="8" name="PB"/>
           <p:cNvSpPr/>
           <p:nvPr/>
         </p:nvSpPr>
@@ -13625,11 +13635,9 @@
           <a:prstGeom prst="rect">
             <a:avLst/>
           </a:prstGeom>
-          <a:blipFill rotWithShape="1">
-            <a:blip r:embed="rId2"/>
-            <a:srcRect/>
-            <a:tile tx="0" ty="0" sx="100000" sy="100000" flip="none" algn="tl"/>
-          </a:blipFill>
+          <a:solidFill>
+            <a:srgbClr val="00A6AC"/>
+          </a:solidFill>
           <a:ln w="12700" cap="flat">
             <a:noFill/>
             <a:miter lim="400000"/>
@@ -13699,6 +13707,13 @@
     <a:masterClrMapping/>
   </p:clrMapOvr>
   <p:transition xmlns:p14="http://schemas.microsoft.com/office/powerpoint/2010/main" spd="med"/>
+  <p:timing>
+    <p:tnLst>
+      <p:par>
+        <p:cTn xmlns:p14="http://schemas.microsoft.com/office/powerpoint/2010/main" id="1" dur="indefinite" restart="never" nodeType="tmRoot"/>
+      </p:par>
+    </p:tnLst>
+  </p:timing>
 </p:sld>
 </file>
 
@@ -13767,7 +13782,7 @@
       </p:sp>
       <p:sp>
         <p:nvSpPr>
-          <p:cNvPr id="7" name="PB"/>
+          <p:cNvPr id="8" name="PB"/>
           <p:cNvSpPr/>
           <p:nvPr/>
         </p:nvSpPr>
@@ -13779,11 +13794,9 @@
           <a:prstGeom prst="rect">
             <a:avLst/>
           </a:prstGeom>
-          <a:blipFill rotWithShape="1">
-            <a:blip r:embed="rId2"/>
-            <a:srcRect/>
-            <a:tile tx="0" ty="0" sx="100000" sy="100000" flip="none" algn="tl"/>
-          </a:blipFill>
+          <a:solidFill>
+            <a:srgbClr val="00A6AC"/>
+          </a:solidFill>
           <a:ln w="12700" cap="flat">
             <a:noFill/>
             <a:miter lim="400000"/>
@@ -13853,6 +13866,13 @@
     <a:masterClrMapping/>
   </p:clrMapOvr>
   <p:transition xmlns:p14="http://schemas.microsoft.com/office/powerpoint/2010/main" spd="med"/>
+  <p:timing>
+    <p:tnLst>
+      <p:par>
+        <p:cTn xmlns:p14="http://schemas.microsoft.com/office/powerpoint/2010/main" id="1" dur="indefinite" restart="never" nodeType="tmRoot"/>
+      </p:par>
+    </p:tnLst>
+  </p:timing>
 </p:sld>
 </file>
 
@@ -13931,7 +13951,7 @@
       </p:sp>
       <p:sp>
         <p:nvSpPr>
-          <p:cNvPr id="7" name="PB"/>
+          <p:cNvPr id="8" name="PB"/>
           <p:cNvSpPr/>
           <p:nvPr/>
         </p:nvSpPr>
@@ -13943,11 +13963,9 @@
           <a:prstGeom prst="rect">
             <a:avLst/>
           </a:prstGeom>
-          <a:blipFill rotWithShape="1">
-            <a:blip r:embed="rId2"/>
-            <a:srcRect/>
-            <a:tile tx="0" ty="0" sx="100000" sy="100000" flip="none" algn="tl"/>
-          </a:blipFill>
+          <a:solidFill>
+            <a:srgbClr val="00A6AC"/>
+          </a:solidFill>
           <a:ln w="12700" cap="flat">
             <a:noFill/>
             <a:miter lim="400000"/>
@@ -14084,7 +14102,7 @@
       </p:sp>
       <p:sp>
         <p:nvSpPr>
-          <p:cNvPr id="6" name="PB"/>
+          <p:cNvPr id="7" name="PB"/>
           <p:cNvSpPr/>
           <p:nvPr/>
         </p:nvSpPr>
@@ -14096,11 +14114,9 @@
           <a:prstGeom prst="rect">
             <a:avLst/>
           </a:prstGeom>
-          <a:blipFill rotWithShape="1">
-            <a:blip r:embed="rId3"/>
-            <a:srcRect/>
-            <a:tile tx="0" ty="0" sx="100000" sy="100000" flip="none" algn="tl"/>
-          </a:blipFill>
+          <a:solidFill>
+            <a:srgbClr val="00A6AC"/>
+          </a:solidFill>
           <a:ln w="12700" cap="flat">
             <a:noFill/>
             <a:miter lim="400000"/>
@@ -14257,7 +14273,7 @@
       </p:sp>
       <p:sp>
         <p:nvSpPr>
-          <p:cNvPr id="7" name="PB"/>
+          <p:cNvPr id="8" name="PB"/>
           <p:cNvSpPr/>
           <p:nvPr/>
         </p:nvSpPr>
@@ -14269,11 +14285,9 @@
           <a:prstGeom prst="rect">
             <a:avLst/>
           </a:prstGeom>
-          <a:blipFill rotWithShape="1">
-            <a:blip r:embed="rId2"/>
-            <a:srcRect/>
-            <a:tile tx="0" ty="0" sx="100000" sy="100000" flip="none" algn="tl"/>
-          </a:blipFill>
+          <a:solidFill>
+            <a:srgbClr val="00A6AC"/>
+          </a:solidFill>
           <a:ln w="12700" cap="flat">
             <a:noFill/>
             <a:miter lim="400000"/>
@@ -14470,7 +14484,7 @@
       </p:sp>
       <p:sp>
         <p:nvSpPr>
-          <p:cNvPr id="7" name="PB"/>
+          <p:cNvPr id="8" name="PB"/>
           <p:cNvSpPr/>
           <p:nvPr/>
         </p:nvSpPr>
@@ -14482,11 +14496,9 @@
           <a:prstGeom prst="rect">
             <a:avLst/>
           </a:prstGeom>
-          <a:blipFill rotWithShape="1">
-            <a:blip r:embed="rId2"/>
-            <a:srcRect/>
-            <a:tile tx="0" ty="0" sx="100000" sy="100000" flip="none" algn="tl"/>
-          </a:blipFill>
+          <a:solidFill>
+            <a:srgbClr val="00A6AC"/>
+          </a:solidFill>
           <a:ln w="12700" cap="flat">
             <a:noFill/>
             <a:miter lim="400000"/>
@@ -14669,7 +14681,7 @@
       </p:sp>
       <p:sp>
         <p:nvSpPr>
-          <p:cNvPr id="7" name="PB"/>
+          <p:cNvPr id="8" name="PB"/>
           <p:cNvSpPr/>
           <p:nvPr/>
         </p:nvSpPr>
@@ -14681,11 +14693,9 @@
           <a:prstGeom prst="rect">
             <a:avLst/>
           </a:prstGeom>
-          <a:blipFill rotWithShape="1">
-            <a:blip r:embed="rId3"/>
-            <a:srcRect/>
-            <a:tile tx="0" ty="0" sx="100000" sy="100000" flip="none" algn="tl"/>
-          </a:blipFill>
+          <a:solidFill>
+            <a:srgbClr val="00A6AC"/>
+          </a:solidFill>
           <a:ln w="12700" cap="flat">
             <a:noFill/>
             <a:miter lim="400000"/>
@@ -14912,7 +14922,7 @@
       </p:sp>
       <p:sp>
         <p:nvSpPr>
-          <p:cNvPr id="7" name="PB"/>
+          <p:cNvPr id="8" name="PB"/>
           <p:cNvSpPr/>
           <p:nvPr/>
         </p:nvSpPr>
@@ -14924,11 +14934,9 @@
           <a:prstGeom prst="rect">
             <a:avLst/>
           </a:prstGeom>
-          <a:blipFill rotWithShape="1">
-            <a:blip r:embed="rId3"/>
-            <a:srcRect/>
-            <a:tile tx="0" ty="0" sx="100000" sy="100000" flip="none" algn="tl"/>
-          </a:blipFill>
+          <a:solidFill>
+            <a:srgbClr val="00A6AC"/>
+          </a:solidFill>
           <a:ln w="12700" cap="flat">
             <a:noFill/>
             <a:miter lim="400000"/>
@@ -15082,7 +15090,7 @@
       </p:sp>
       <p:sp>
         <p:nvSpPr>
-          <p:cNvPr id="7" name="PB"/>
+          <p:cNvPr id="8" name="PB"/>
           <p:cNvSpPr/>
           <p:nvPr/>
         </p:nvSpPr>
@@ -15094,11 +15102,9 @@
           <a:prstGeom prst="rect">
             <a:avLst/>
           </a:prstGeom>
-          <a:blipFill rotWithShape="1">
-            <a:blip r:embed="rId2"/>
-            <a:srcRect/>
-            <a:tile tx="0" ty="0" sx="100000" sy="100000" flip="none" algn="tl"/>
-          </a:blipFill>
+          <a:solidFill>
+            <a:srgbClr val="00A6AC"/>
+          </a:solidFill>
           <a:ln w="12700" cap="flat">
             <a:noFill/>
             <a:miter lim="400000"/>
@@ -15496,7 +15502,7 @@
       </p:sp>
       <p:sp>
         <p:nvSpPr>
-          <p:cNvPr id="7" name="PB"/>
+          <p:cNvPr id="8" name="PB"/>
           <p:cNvSpPr/>
           <p:nvPr/>
         </p:nvSpPr>
@@ -15508,11 +15514,9 @@
           <a:prstGeom prst="rect">
             <a:avLst/>
           </a:prstGeom>
-          <a:blipFill rotWithShape="1">
-            <a:blip r:embed="rId3"/>
-            <a:srcRect/>
-            <a:tile tx="0" ty="0" sx="100000" sy="100000" flip="none" algn="tl"/>
-          </a:blipFill>
+          <a:solidFill>
+            <a:srgbClr val="00A6AC"/>
+          </a:solidFill>
           <a:ln w="12700" cap="flat">
             <a:noFill/>
             <a:miter lim="400000"/>
@@ -15683,7 +15687,7 @@
       </p:sp>
       <p:sp>
         <p:nvSpPr>
-          <p:cNvPr id="7" name="PB"/>
+          <p:cNvPr id="8" name="PB"/>
           <p:cNvSpPr/>
           <p:nvPr/>
         </p:nvSpPr>
@@ -15695,11 +15699,9 @@
           <a:prstGeom prst="rect">
             <a:avLst/>
           </a:prstGeom>
-          <a:blipFill rotWithShape="1">
-            <a:blip r:embed="rId3"/>
-            <a:srcRect/>
-            <a:tile tx="0" ty="0" sx="100000" sy="100000" flip="none" algn="tl"/>
-          </a:blipFill>
+          <a:solidFill>
+            <a:srgbClr val="00A6AC"/>
+          </a:solidFill>
           <a:ln w="12700" cap="flat">
             <a:noFill/>
             <a:miter lim="400000"/>
@@ -16025,7 +16027,7 @@
       </p:sp>
       <p:sp>
         <p:nvSpPr>
-          <p:cNvPr id="7" name="PB"/>
+          <p:cNvPr id="8" name="PB"/>
           <p:cNvSpPr/>
           <p:nvPr/>
         </p:nvSpPr>
@@ -16037,11 +16039,9 @@
           <a:prstGeom prst="rect">
             <a:avLst/>
           </a:prstGeom>
-          <a:blipFill rotWithShape="1">
-            <a:blip r:embed="rId4"/>
-            <a:srcRect/>
-            <a:tile tx="0" ty="0" sx="100000" sy="100000" flip="none" algn="tl"/>
-          </a:blipFill>
+          <a:solidFill>
+            <a:srgbClr val="00A6AC"/>
+          </a:solidFill>
           <a:ln w="12700" cap="flat">
             <a:noFill/>
             <a:miter lim="400000"/>
@@ -16242,7 +16242,7 @@
       </p:sp>
       <p:sp>
         <p:nvSpPr>
-          <p:cNvPr id="6" name="PB"/>
+          <p:cNvPr id="7" name="PB"/>
           <p:cNvSpPr/>
           <p:nvPr/>
         </p:nvSpPr>
@@ -16254,11 +16254,9 @@
           <a:prstGeom prst="rect">
             <a:avLst/>
           </a:prstGeom>
-          <a:blipFill rotWithShape="1">
-            <a:blip r:embed="rId2"/>
-            <a:srcRect/>
-            <a:tile tx="0" ty="0" sx="100000" sy="100000" flip="none" algn="tl"/>
-          </a:blipFill>
+          <a:solidFill>
+            <a:srgbClr val="00A6AC"/>
+          </a:solidFill>
           <a:ln w="12700" cap="flat">
             <a:noFill/>
             <a:miter lim="400000"/>
@@ -16423,7 +16421,7 @@
       </p:sp>
       <p:sp>
         <p:nvSpPr>
-          <p:cNvPr id="7" name="PB"/>
+          <p:cNvPr id="8" name="PB"/>
           <p:cNvSpPr/>
           <p:nvPr/>
         </p:nvSpPr>
@@ -16435,11 +16433,9 @@
           <a:prstGeom prst="rect">
             <a:avLst/>
           </a:prstGeom>
-          <a:blipFill rotWithShape="1">
-            <a:blip r:embed="rId2"/>
-            <a:srcRect/>
-            <a:tile tx="0" ty="0" sx="100000" sy="100000" flip="none" algn="tl"/>
-          </a:blipFill>
+          <a:solidFill>
+            <a:srgbClr val="00A6AC"/>
+          </a:solidFill>
           <a:ln w="12700" cap="flat">
             <a:noFill/>
             <a:miter lim="400000"/>
@@ -16590,7 +16586,7 @@
       </p:sp>
       <p:sp>
         <p:nvSpPr>
-          <p:cNvPr id="7" name="PB"/>
+          <p:cNvPr id="8" name="PB"/>
           <p:cNvSpPr/>
           <p:nvPr/>
         </p:nvSpPr>
@@ -16602,11 +16598,9 @@
           <a:prstGeom prst="rect">
             <a:avLst/>
           </a:prstGeom>
-          <a:blipFill rotWithShape="1">
-            <a:blip r:embed="rId2"/>
-            <a:srcRect/>
-            <a:tile tx="0" ty="0" sx="100000" sy="100000" flip="none" algn="tl"/>
-          </a:blipFill>
+          <a:solidFill>
+            <a:srgbClr val="00A6AC"/>
+          </a:solidFill>
           <a:ln w="12700" cap="flat">
             <a:noFill/>
             <a:miter lim="400000"/>
@@ -16879,7 +16873,7 @@
       </p:sp>
       <p:sp>
         <p:nvSpPr>
-          <p:cNvPr id="7" name="PB"/>
+          <p:cNvPr id="8" name="PB"/>
           <p:cNvSpPr/>
           <p:nvPr/>
         </p:nvSpPr>
@@ -16891,11 +16885,9 @@
           <a:prstGeom prst="rect">
             <a:avLst/>
           </a:prstGeom>
-          <a:blipFill rotWithShape="1">
-            <a:blip r:embed="rId3"/>
-            <a:srcRect/>
-            <a:tile tx="0" ty="0" sx="100000" sy="100000" flip="none" algn="tl"/>
-          </a:blipFill>
+          <a:solidFill>
+            <a:srgbClr val="00A6AC"/>
+          </a:solidFill>
           <a:ln w="12700" cap="flat">
             <a:noFill/>
             <a:miter lim="400000"/>
@@ -17052,7 +17044,7 @@
       </p:sp>
       <p:sp>
         <p:nvSpPr>
-          <p:cNvPr id="7" name="PB"/>
+          <p:cNvPr id="8" name="PB"/>
           <p:cNvSpPr/>
           <p:nvPr/>
         </p:nvSpPr>
@@ -17064,11 +17056,9 @@
           <a:prstGeom prst="rect">
             <a:avLst/>
           </a:prstGeom>
-          <a:blipFill rotWithShape="1">
-            <a:blip r:embed="rId2"/>
-            <a:srcRect/>
-            <a:tile tx="0" ty="0" sx="100000" sy="100000" flip="none" algn="tl"/>
-          </a:blipFill>
+          <a:solidFill>
+            <a:srgbClr val="00A6AC"/>
+          </a:solidFill>
           <a:ln w="12700" cap="flat">
             <a:noFill/>
             <a:miter lim="400000"/>
@@ -17443,7 +17433,7 @@
       </p:sp>
       <p:sp>
         <p:nvSpPr>
-          <p:cNvPr id="8" name="PB"/>
+          <p:cNvPr id="9" name="PB"/>
           <p:cNvSpPr/>
           <p:nvPr/>
         </p:nvSpPr>
@@ -17455,11 +17445,9 @@
           <a:prstGeom prst="rect">
             <a:avLst/>
           </a:prstGeom>
-          <a:blipFill rotWithShape="1">
-            <a:blip r:embed="rId3"/>
-            <a:srcRect/>
-            <a:tile tx="0" ty="0" sx="100000" sy="100000" flip="none" algn="tl"/>
-          </a:blipFill>
+          <a:solidFill>
+            <a:srgbClr val="00A6AC"/>
+          </a:solidFill>
           <a:ln w="12700" cap="flat">
             <a:noFill/>
             <a:miter lim="400000"/>
@@ -17627,7 +17615,7 @@
       </p:sp>
       <p:sp>
         <p:nvSpPr>
-          <p:cNvPr id="7" name="PB"/>
+          <p:cNvPr id="8" name="PB"/>
           <p:cNvSpPr/>
           <p:nvPr/>
         </p:nvSpPr>
@@ -17639,11 +17627,9 @@
           <a:prstGeom prst="rect">
             <a:avLst/>
           </a:prstGeom>
-          <a:blipFill rotWithShape="1">
-            <a:blip r:embed="rId2"/>
-            <a:srcRect/>
-            <a:tile tx="0" ty="0" sx="100000" sy="100000" flip="none" algn="tl"/>
-          </a:blipFill>
+          <a:solidFill>
+            <a:srgbClr val="00A6AC"/>
+          </a:solidFill>
           <a:ln w="12700" cap="flat">
             <a:noFill/>
             <a:miter lim="400000"/>
@@ -17917,7 +17903,7 @@
       </p:pic>
       <p:sp>
         <p:nvSpPr>
-          <p:cNvPr id="8" name="PB"/>
+          <p:cNvPr id="9" name="PB"/>
           <p:cNvSpPr/>
           <p:nvPr/>
         </p:nvSpPr>
@@ -17929,11 +17915,9 @@
           <a:prstGeom prst="rect">
             <a:avLst/>
           </a:prstGeom>
-          <a:blipFill rotWithShape="1">
-            <a:blip r:embed="rId3"/>
-            <a:srcRect/>
-            <a:tile tx="0" ty="0" sx="100000" sy="100000" flip="none" algn="tl"/>
-          </a:blipFill>
+          <a:solidFill>
+            <a:srgbClr val="00A6AC"/>
+          </a:solidFill>
           <a:ln w="12700" cap="flat">
             <a:noFill/>
             <a:miter lim="400000"/>
@@ -18103,7 +18087,7 @@
       </p:sp>
       <p:sp>
         <p:nvSpPr>
-          <p:cNvPr id="7" name="PB"/>
+          <p:cNvPr id="8" name="PB"/>
           <p:cNvSpPr/>
           <p:nvPr/>
         </p:nvSpPr>
@@ -18115,11 +18099,9 @@
           <a:prstGeom prst="rect">
             <a:avLst/>
           </a:prstGeom>
-          <a:blipFill rotWithShape="1">
-            <a:blip r:embed="rId2"/>
-            <a:srcRect/>
-            <a:tile tx="0" ty="0" sx="100000" sy="100000" flip="none" algn="tl"/>
-          </a:blipFill>
+          <a:solidFill>
+            <a:srgbClr val="00A6AC"/>
+          </a:solidFill>
           <a:ln w="12700" cap="flat">
             <a:noFill/>
             <a:miter lim="400000"/>
@@ -18299,7 +18281,7 @@
       </p:sp>
       <p:sp>
         <p:nvSpPr>
-          <p:cNvPr id="6" name="PB"/>
+          <p:cNvPr id="7" name="PB"/>
           <p:cNvSpPr/>
           <p:nvPr/>
         </p:nvSpPr>
@@ -18311,11 +18293,9 @@
           <a:prstGeom prst="rect">
             <a:avLst/>
           </a:prstGeom>
-          <a:blipFill rotWithShape="1">
-            <a:blip r:embed="rId3"/>
-            <a:srcRect/>
-            <a:tile tx="0" ty="0" sx="100000" sy="100000" flip="none" algn="tl"/>
-          </a:blipFill>
+          <a:solidFill>
+            <a:srgbClr val="00A6AC"/>
+          </a:solidFill>
           <a:ln w="12700" cap="flat">
             <a:noFill/>
             <a:miter lim="400000"/>
@@ -18614,7 +18594,7 @@
       </p:sp>
       <p:sp>
         <p:nvSpPr>
-          <p:cNvPr id="6" name="PB"/>
+          <p:cNvPr id="7" name="PB"/>
           <p:cNvSpPr/>
           <p:nvPr/>
         </p:nvSpPr>
@@ -18626,11 +18606,9 @@
           <a:prstGeom prst="rect">
             <a:avLst/>
           </a:prstGeom>
-          <a:blipFill rotWithShape="1">
-            <a:blip r:embed="rId3"/>
-            <a:srcRect/>
-            <a:tile tx="0" ty="0" sx="100000" sy="100000" flip="none" algn="tl"/>
-          </a:blipFill>
+          <a:solidFill>
+            <a:srgbClr val="00A6AC"/>
+          </a:solidFill>
           <a:ln w="12700" cap="flat">
             <a:noFill/>
             <a:miter lim="400000"/>
@@ -18917,7 +18895,7 @@
       </p:sp>
       <p:sp>
         <p:nvSpPr>
-          <p:cNvPr id="7" name="PB"/>
+          <p:cNvPr id="8" name="PB"/>
           <p:cNvSpPr/>
           <p:nvPr/>
         </p:nvSpPr>
@@ -18929,11 +18907,9 @@
           <a:prstGeom prst="rect">
             <a:avLst/>
           </a:prstGeom>
-          <a:blipFill rotWithShape="1">
-            <a:blip r:embed="rId3"/>
-            <a:srcRect/>
-            <a:tile tx="0" ty="0" sx="100000" sy="100000" flip="none" algn="tl"/>
-          </a:blipFill>
+          <a:solidFill>
+            <a:srgbClr val="00A6AC"/>
+          </a:solidFill>
           <a:ln w="12700" cap="flat">
             <a:noFill/>
             <a:miter lim="400000"/>
@@ -19231,7 +19207,7 @@
       </p:sp>
       <p:sp>
         <p:nvSpPr>
-          <p:cNvPr id="7" name="PB"/>
+          <p:cNvPr id="8" name="PB"/>
           <p:cNvSpPr/>
           <p:nvPr/>
         </p:nvSpPr>
@@ -19243,11 +19219,9 @@
           <a:prstGeom prst="rect">
             <a:avLst/>
           </a:prstGeom>
-          <a:blipFill rotWithShape="1">
-            <a:blip r:embed="rId2"/>
-            <a:srcRect/>
-            <a:tile tx="0" ty="0" sx="100000" sy="100000" flip="none" algn="tl"/>
-          </a:blipFill>
+          <a:solidFill>
+            <a:srgbClr val="00A6AC"/>
+          </a:solidFill>
           <a:ln w="12700" cap="flat">
             <a:noFill/>
             <a:miter lim="400000"/>
@@ -19373,7 +19347,7 @@
       </p:sp>
       <p:sp>
         <p:nvSpPr>
-          <p:cNvPr id="6" name="PB"/>
+          <p:cNvPr id="7" name="PB"/>
           <p:cNvSpPr/>
           <p:nvPr/>
         </p:nvSpPr>
@@ -19385,11 +19359,9 @@
           <a:prstGeom prst="rect">
             <a:avLst/>
           </a:prstGeom>
-          <a:blipFill rotWithShape="1">
-            <a:blip r:embed="rId3"/>
-            <a:srcRect/>
-            <a:tile tx="0" ty="0" sx="100000" sy="100000" flip="none" algn="tl"/>
-          </a:blipFill>
+          <a:solidFill>
+            <a:srgbClr val="00A6AC"/>
+          </a:solidFill>
           <a:ln w="12700" cap="flat">
             <a:noFill/>
             <a:miter lim="400000"/>
@@ -19611,7 +19583,7 @@
       </p:sp>
       <p:sp>
         <p:nvSpPr>
-          <p:cNvPr id="7" name="PB"/>
+          <p:cNvPr id="8" name="PB"/>
           <p:cNvSpPr/>
           <p:nvPr/>
         </p:nvSpPr>
@@ -19623,11 +19595,9 @@
           <a:prstGeom prst="rect">
             <a:avLst/>
           </a:prstGeom>
-          <a:blipFill rotWithShape="1">
-            <a:blip r:embed="rId3"/>
-            <a:srcRect/>
-            <a:tile tx="0" ty="0" sx="100000" sy="100000" flip="none" algn="tl"/>
-          </a:blipFill>
+          <a:solidFill>
+            <a:srgbClr val="00A6AC"/>
+          </a:solidFill>
           <a:ln w="12700" cap="flat">
             <a:noFill/>
             <a:miter lim="400000"/>
@@ -19991,7 +19961,7 @@
       </p:sp>
       <p:sp>
         <p:nvSpPr>
-          <p:cNvPr id="8" name="PB"/>
+          <p:cNvPr id="9" name="PB"/>
           <p:cNvSpPr/>
           <p:nvPr/>
         </p:nvSpPr>
@@ -20003,11 +19973,9 @@
           <a:prstGeom prst="rect">
             <a:avLst/>
           </a:prstGeom>
-          <a:blipFill rotWithShape="1">
-            <a:blip r:embed="rId3"/>
-            <a:srcRect/>
-            <a:tile tx="0" ty="0" sx="100000" sy="100000" flip="none" algn="tl"/>
-          </a:blipFill>
+          <a:solidFill>
+            <a:srgbClr val="00A6AC"/>
+          </a:solidFill>
           <a:ln w="12700" cap="flat">
             <a:noFill/>
             <a:miter lim="400000"/>

</xml_diff>